<commit_message>
Presentation update and new POC implementation
</commit_message>
<xml_diff>
--- a/Triangular Tahzoo.pptx
+++ b/Triangular Tahzoo.pptx
@@ -132,7 +132,7 @@
   </p:defaultTextStyle>
   <p:extLst>
     <p:ext uri="{EFAFB233-063F-42B5-8137-9DF3F51BA10A}">
-      <p15:sldGuideLst xmlns:p15="http://schemas.microsoft.com/office/powerpoint/2012/main" xmlns="">
+      <p15:sldGuideLst xmlns="" xmlns:p15="http://schemas.microsoft.com/office/powerpoint/2012/main">
         <p15:guide id="1" orient="horz" pos="2152">
           <p15:clr>
             <a:srgbClr val="A4A3A4"/>
@@ -251,7 +251,7 @@
           <a:p>
             <a:fld id="{22FCF9EC-ACBF-D54F-916F-A4DCD4FC4138}" type="datetime1">
               <a:rPr lang="en-US" smtClean="0"/>
-              <a:t>9/11/2015</a:t>
+              <a:t>9/14/2015</a:t>
             </a:fld>
             <a:endParaRPr lang="en-US"/>
           </a:p>
@@ -417,7 +417,7 @@
           <a:p>
             <a:fld id="{47A89FCD-BCA4-384B-B700-16365161155E}" type="datetime1">
               <a:rPr lang="en-US" smtClean="0"/>
-              <a:t>9/11/2015</a:t>
+              <a:t>9/14/2015</a:t>
             </a:fld>
             <a:endParaRPr lang="en-US"/>
           </a:p>
@@ -782,7 +782,7 @@
           <a:p>
             <a:fld id="{AD084E28-D540-D543-B9F8-262A71E684F4}" type="datetime4">
               <a:rPr lang="en-US" smtClean="0"/>
-              <a:t>September 11, 2015</a:t>
+              <a:t>September 14, 2015</a:t>
             </a:fld>
             <a:endParaRPr lang="en-US" dirty="0"/>
           </a:p>
@@ -8934,7 +8934,7 @@
           <a:p>
             <a:fld id="{B6237093-3560-A740-BA07-804BF0D051D3}" type="datetime4">
               <a:rPr lang="en-US" smtClean="0"/>
-              <a:t>September 11, 2015</a:t>
+              <a:t>September 14, 2015</a:t>
             </a:fld>
             <a:endParaRPr lang="en-US"/>
           </a:p>
@@ -9490,7 +9490,6 @@
               <a:rPr lang="en-US" sz="2000" dirty="0"/>
               <a:t>value fields</a:t>
             </a:r>
-            <a:endParaRPr lang="en-US" sz="2000" dirty="0"/>
           </a:p>
           <a:p>
             <a:r>
@@ -11239,57 +11238,47 @@
           <a:bodyPr/>
           <a:lstStyle/>
           <a:p>
-            <a:pPr marL="0" indent="0">
-              <a:buNone/>
-            </a:pPr>
             <a:r>
               <a:rPr lang="en-IE" dirty="0" smtClean="0"/>
-              <a:t>Front-end development is now as mature as back-end development supporting unit testing, CI/CD, separation of concerns, dependency management, etc.</a:t>
-            </a:r>
-          </a:p>
-          <a:p>
-            <a:pPr marL="0" indent="0">
-              <a:buNone/>
-            </a:pPr>
+              <a:t>Maturity of front-end development</a:t>
+            </a:r>
+            <a:endParaRPr lang="en-IE" dirty="0" smtClean="0"/>
+          </a:p>
+          <a:p>
             <a:r>
               <a:rPr lang="en-IE" dirty="0" smtClean="0"/>
-              <a:t>Client side </a:t>
-            </a:r>
-            <a:r>
-              <a:rPr lang="en-IE" dirty="0" err="1" smtClean="0"/>
-              <a:t>templating</a:t>
-            </a:r>
+              <a:t>Offload templating from server to client</a:t>
+            </a:r>
+            <a:endParaRPr lang="en-IE" dirty="0" smtClean="0"/>
+          </a:p>
+          <a:p>
             <a:r>
               <a:rPr lang="en-IE" dirty="0" smtClean="0"/>
-              <a:t> off-loads tasks from the server and allows the UI to respond to changes faster.</a:t>
-            </a:r>
-          </a:p>
-          <a:p>
-            <a:pPr marL="0" indent="0">
-              <a:buNone/>
-            </a:pPr>
+              <a:t>Faster prototyping and development cycles</a:t>
+            </a:r>
+            <a:endParaRPr lang="en-IE" dirty="0" smtClean="0"/>
+          </a:p>
+          <a:p>
             <a:r>
               <a:rPr lang="en-IE" dirty="0" smtClean="0"/>
-              <a:t>Development work takes place closer to the origin of the requirements.</a:t>
-            </a:r>
-          </a:p>
-          <a:p>
-            <a:pPr marL="0" indent="0">
-              <a:buNone/>
-            </a:pPr>
+              <a:t>Angular is </a:t>
+            </a:r>
             <a:r>
               <a:rPr lang="en-IE" dirty="0" smtClean="0"/>
-              <a:t>Angular is the most full-featured, stable and adopted client side MVC framework.</a:t>
-            </a:r>
-          </a:p>
-          <a:p>
-            <a:pPr marL="0" indent="0">
-              <a:buNone/>
-            </a:pPr>
+              <a:t>the current “best practice” framework</a:t>
+            </a:r>
+            <a:endParaRPr lang="en-IE" dirty="0" smtClean="0"/>
+          </a:p>
+          <a:p>
             <a:r>
               <a:rPr lang="en-IE" dirty="0" smtClean="0"/>
-              <a:t>DD4T gives you rich model data and takes care of binary publishing. It is better supported and maintained than CT4T.</a:t>
-            </a:r>
+              <a:t>DD4T </a:t>
+            </a:r>
+            <a:r>
+              <a:rPr lang="en-IE" dirty="0" smtClean="0"/>
+              <a:t>supplies the data model OOB</a:t>
+            </a:r>
+            <a:endParaRPr lang="en-IE" dirty="0" smtClean="0"/>
           </a:p>
         </p:txBody>
       </p:sp>
@@ -14405,7 +14394,6 @@
               <a:rPr lang="en-US" sz="2000" dirty="0" smtClean="0"/>
               <a:t>As little custom components as possible</a:t>
             </a:r>
-            <a:endParaRPr lang="en-US" sz="2000" dirty="0" smtClean="0"/>
           </a:p>
           <a:p>
             <a:pPr lvl="1"/>
@@ -15456,31 +15444,6 @@
 </file>
 
 <file path=customXml/item1.xml><?xml version="1.0" encoding="utf-8"?>
-<?mso-contentType ?>
-<FormTemplates xmlns="http://schemas.microsoft.com/sharepoint/v3/contenttype/forms">
-  <Display>DocumentLibraryForm</Display>
-  <Edit>DocumentLibraryForm</Edit>
-  <New>DocumentLibraryForm</New>
-</FormTemplates>
-</file>
-
-<file path=customXml/item2.xml><?xml version="1.0" encoding="utf-8"?>
-<p:properties xmlns:p="http://schemas.microsoft.com/office/2006/metadata/properties" xmlns:xsi="http://www.w3.org/2001/XMLSchema-instance" xmlns:pc="http://schemas.microsoft.com/office/infopath/2007/PartnerControls">
-  <documentManagement>
-    <SharedWithUsers xmlns="f28c0727-7724-46b5-9aa9-1e46eeee94ce">
-      <UserInfo>
-        <DisplayName>Jennifer Harris</DisplayName>
-        <AccountId>133</AccountId>
-        <AccountType/>
-      </UserInfo>
-    </SharedWithUsers>
-    <SharingHintHash xmlns="f28c0727-7724-46b5-9aa9-1e46eeee94ce">1017589915</SharingHintHash>
-    <IconOverlay xmlns="http://schemas.microsoft.com/sharepoint/v4" xsi:nil="true"/>
-  </documentManagement>
-</p:properties>
-</file>
-
-<file path=customXml/item3.xml><?xml version="1.0" encoding="utf-8"?>
 <ct:contentTypeSchema xmlns:ct="http://schemas.microsoft.com/office/2006/metadata/contentType" xmlns:ma="http://schemas.microsoft.com/office/2006/metadata/properties/metaAttributes" ct:_="" ma:_="" ma:contentTypeName="Document" ma:contentTypeID="0x0101007F5D9F714DA0FD439506A90124204C8D" ma:contentTypeVersion="4" ma:contentTypeDescription="Create a new document." ma:contentTypeScope="" ma:versionID="e315ef14661dc1a04fb21676a0286ccd">
   <xsd:schema xmlns:xsd="http://www.w3.org/2001/XMLSchema" xmlns:xs="http://www.w3.org/2001/XMLSchema" xmlns:p="http://schemas.microsoft.com/office/2006/metadata/properties" xmlns:ns2="f28c0727-7724-46b5-9aa9-1e46eeee94ce" xmlns:ns3="43914df0-9e2b-4fe6-80d5-af2d67d36291" xmlns:ns4="http://schemas.microsoft.com/sharepoint/v4" targetNamespace="http://schemas.microsoft.com/office/2006/metadata/properties" ma:root="true" ma:fieldsID="25e77982d2f51bd6f03315b581a08ea5" ns2:_="" ns3:_="" ns4:_="">
     <xsd:import namespace="f28c0727-7724-46b5-9aa9-1e46eeee94ce"/>
@@ -15650,10 +15613,47 @@
 </ct:contentTypeSchema>
 </file>
 
+<file path=customXml/item2.xml><?xml version="1.0" encoding="utf-8"?>
+<p:properties xmlns:p="http://schemas.microsoft.com/office/2006/metadata/properties" xmlns:xsi="http://www.w3.org/2001/XMLSchema-instance" xmlns:pc="http://schemas.microsoft.com/office/infopath/2007/PartnerControls">
+  <documentManagement>
+    <SharedWithUsers xmlns="f28c0727-7724-46b5-9aa9-1e46eeee94ce">
+      <UserInfo>
+        <DisplayName>Jennifer Harris</DisplayName>
+        <AccountId>133</AccountId>
+        <AccountType/>
+      </UserInfo>
+    </SharedWithUsers>
+    <SharingHintHash xmlns="f28c0727-7724-46b5-9aa9-1e46eeee94ce">1017589915</SharingHintHash>
+    <IconOverlay xmlns="http://schemas.microsoft.com/sharepoint/v4" xsi:nil="true"/>
+  </documentManagement>
+</p:properties>
+</file>
+
+<file path=customXml/item3.xml><?xml version="1.0" encoding="utf-8"?>
+<?mso-contentType ?>
+<FormTemplates xmlns="http://schemas.microsoft.com/sharepoint/v3/contenttype/forms">
+  <Display>DocumentLibraryForm</Display>
+  <Edit>DocumentLibraryForm</Edit>
+  <New>DocumentLibraryForm</New>
+</FormTemplates>
+</file>
+
 <file path=customXml/itemProps1.xml><?xml version="1.0" encoding="utf-8"?>
-<ds:datastoreItem xmlns:ds="http://schemas.openxmlformats.org/officeDocument/2006/customXml" ds:itemID="{B2668917-F5C0-483E-8D06-AC2DD0F9637C}">
+<ds:datastoreItem xmlns:ds="http://schemas.openxmlformats.org/officeDocument/2006/customXml" ds:itemID="{5B240E80-37CD-4CAA-8B5E-2A73B0F96583}">
   <ds:schemaRefs>
-    <ds:schemaRef ds:uri="http://schemas.microsoft.com/sharepoint/v3/contenttype/forms"/>
+    <ds:schemaRef ds:uri="http://schemas.microsoft.com/office/2006/metadata/contentType"/>
+    <ds:schemaRef ds:uri="http://schemas.microsoft.com/office/2006/metadata/properties/metaAttributes"/>
+    <ds:schemaRef ds:uri="http://www.w3.org/2001/XMLSchema"/>
+    <ds:schemaRef ds:uri="http://schemas.microsoft.com/office/2006/metadata/properties"/>
+    <ds:schemaRef ds:uri="f28c0727-7724-46b5-9aa9-1e46eeee94ce"/>
+    <ds:schemaRef ds:uri="43914df0-9e2b-4fe6-80d5-af2d67d36291"/>
+    <ds:schemaRef ds:uri="http://schemas.microsoft.com/sharepoint/v4"/>
+    <ds:schemaRef ds:uri="http://schemas.microsoft.com/office/2006/documentManagement/types"/>
+    <ds:schemaRef ds:uri="http://schemas.microsoft.com/office/infopath/2007/PartnerControls"/>
+    <ds:schemaRef ds:uri="http://schemas.openxmlformats.org/package/2006/metadata/core-properties"/>
+    <ds:schemaRef ds:uri="http://purl.org/dc/elements/1.1/"/>
+    <ds:schemaRef ds:uri="http://purl.org/dc/terms/"/>
+    <ds:schemaRef ds:uri="http://schemas.microsoft.com/internal/obd"/>
   </ds:schemaRefs>
 </ds:datastoreItem>
 </file>
@@ -15677,21 +15677,9 @@
 </file>
 
 <file path=customXml/itemProps3.xml><?xml version="1.0" encoding="utf-8"?>
-<ds:datastoreItem xmlns:ds="http://schemas.openxmlformats.org/officeDocument/2006/customXml" ds:itemID="{5B240E80-37CD-4CAA-8B5E-2A73B0F96583}">
+<ds:datastoreItem xmlns:ds="http://schemas.openxmlformats.org/officeDocument/2006/customXml" ds:itemID="{B2668917-F5C0-483E-8D06-AC2DD0F9637C}">
   <ds:schemaRefs>
-    <ds:schemaRef ds:uri="http://schemas.microsoft.com/office/2006/metadata/contentType"/>
-    <ds:schemaRef ds:uri="http://schemas.microsoft.com/office/2006/metadata/properties/metaAttributes"/>
-    <ds:schemaRef ds:uri="http://www.w3.org/2001/XMLSchema"/>
-    <ds:schemaRef ds:uri="http://schemas.microsoft.com/office/2006/metadata/properties"/>
-    <ds:schemaRef ds:uri="f28c0727-7724-46b5-9aa9-1e46eeee94ce"/>
-    <ds:schemaRef ds:uri="43914df0-9e2b-4fe6-80d5-af2d67d36291"/>
-    <ds:schemaRef ds:uri="http://schemas.microsoft.com/sharepoint/v4"/>
-    <ds:schemaRef ds:uri="http://schemas.microsoft.com/office/2006/documentManagement/types"/>
-    <ds:schemaRef ds:uri="http://schemas.microsoft.com/office/infopath/2007/PartnerControls"/>
-    <ds:schemaRef ds:uri="http://schemas.openxmlformats.org/package/2006/metadata/core-properties"/>
-    <ds:schemaRef ds:uri="http://purl.org/dc/elements/1.1/"/>
-    <ds:schemaRef ds:uri="http://purl.org/dc/terms/"/>
-    <ds:schemaRef ds:uri="http://schemas.microsoft.com/internal/obd"/>
+    <ds:schemaRef ds:uri="http://schemas.microsoft.com/sharepoint/v3/contenttype/forms"/>
   </ds:schemaRefs>
 </ds:datastoreItem>
 </file>
</xml_diff>